<commit_message>
Removed some unused using statements, updated ERD pdf and ppt files.
</commit_message>
<xml_diff>
--- a/ReservationSystem/ReservationSystem/Reservation System.pptx
+++ b/ReservationSystem/ReservationSystem/Reservation System.pptx
@@ -9,16 +9,17 @@
     <p:sldId id="257" r:id="rId3"/>
     <p:sldId id="266" r:id="rId4"/>
     <p:sldId id="264" r:id="rId5"/>
-    <p:sldId id="265" r:id="rId6"/>
-    <p:sldId id="269" r:id="rId7"/>
-    <p:sldId id="258" r:id="rId8"/>
-    <p:sldId id="259" r:id="rId9"/>
-    <p:sldId id="267" r:id="rId10"/>
-    <p:sldId id="260" r:id="rId11"/>
-    <p:sldId id="268" r:id="rId12"/>
-    <p:sldId id="261" r:id="rId13"/>
-    <p:sldId id="263" r:id="rId14"/>
-    <p:sldId id="262" r:id="rId15"/>
+    <p:sldId id="270" r:id="rId6"/>
+    <p:sldId id="265" r:id="rId7"/>
+    <p:sldId id="269" r:id="rId8"/>
+    <p:sldId id="258" r:id="rId9"/>
+    <p:sldId id="259" r:id="rId10"/>
+    <p:sldId id="267" r:id="rId11"/>
+    <p:sldId id="260" r:id="rId12"/>
+    <p:sldId id="268" r:id="rId13"/>
+    <p:sldId id="261" r:id="rId14"/>
+    <p:sldId id="263" r:id="rId15"/>
+    <p:sldId id="262" r:id="rId16"/>
   </p:sldIdLst>
   <p:sldSz cx="12192000" cy="6858000"/>
   <p:notesSz cx="6858000" cy="9144000"/>
@@ -256,7 +257,7 @@
           <a:p>
             <a:fld id="{4FE021FB-C01A-47ED-8D0F-862E0EEFC0D9}" type="datetimeFigureOut">
               <a:rPr lang="en-US" smtClean="0"/>
-              <a:t>5/6/2022</a:t>
+              <a:t>5/11/2022</a:t>
             </a:fld>
             <a:endParaRPr lang="en-US"/>
           </a:p>
@@ -426,7 +427,7 @@
           <a:p>
             <a:fld id="{4FE021FB-C01A-47ED-8D0F-862E0EEFC0D9}" type="datetimeFigureOut">
               <a:rPr lang="en-US" smtClean="0"/>
-              <a:t>5/6/2022</a:t>
+              <a:t>5/11/2022</a:t>
             </a:fld>
             <a:endParaRPr lang="en-US"/>
           </a:p>
@@ -606,7 +607,7 @@
           <a:p>
             <a:fld id="{4FE021FB-C01A-47ED-8D0F-862E0EEFC0D9}" type="datetimeFigureOut">
               <a:rPr lang="en-US" smtClean="0"/>
-              <a:t>5/6/2022</a:t>
+              <a:t>5/11/2022</a:t>
             </a:fld>
             <a:endParaRPr lang="en-US"/>
           </a:p>
@@ -776,7 +777,7 @@
           <a:p>
             <a:fld id="{4FE021FB-C01A-47ED-8D0F-862E0EEFC0D9}" type="datetimeFigureOut">
               <a:rPr lang="en-US" smtClean="0"/>
-              <a:t>5/6/2022</a:t>
+              <a:t>5/11/2022</a:t>
             </a:fld>
             <a:endParaRPr lang="en-US"/>
           </a:p>
@@ -1022,7 +1023,7 @@
           <a:p>
             <a:fld id="{4FE021FB-C01A-47ED-8D0F-862E0EEFC0D9}" type="datetimeFigureOut">
               <a:rPr lang="en-US" smtClean="0"/>
-              <a:t>5/6/2022</a:t>
+              <a:t>5/11/2022</a:t>
             </a:fld>
             <a:endParaRPr lang="en-US"/>
           </a:p>
@@ -1254,7 +1255,7 @@
           <a:p>
             <a:fld id="{4FE021FB-C01A-47ED-8D0F-862E0EEFC0D9}" type="datetimeFigureOut">
               <a:rPr lang="en-US" smtClean="0"/>
-              <a:t>5/6/2022</a:t>
+              <a:t>5/11/2022</a:t>
             </a:fld>
             <a:endParaRPr lang="en-US"/>
           </a:p>
@@ -1621,7 +1622,7 @@
           <a:p>
             <a:fld id="{4FE021FB-C01A-47ED-8D0F-862E0EEFC0D9}" type="datetimeFigureOut">
               <a:rPr lang="en-US" smtClean="0"/>
-              <a:t>5/6/2022</a:t>
+              <a:t>5/11/2022</a:t>
             </a:fld>
             <a:endParaRPr lang="en-US"/>
           </a:p>
@@ -1739,7 +1740,7 @@
           <a:p>
             <a:fld id="{4FE021FB-C01A-47ED-8D0F-862E0EEFC0D9}" type="datetimeFigureOut">
               <a:rPr lang="en-US" smtClean="0"/>
-              <a:t>5/6/2022</a:t>
+              <a:t>5/11/2022</a:t>
             </a:fld>
             <a:endParaRPr lang="en-US"/>
           </a:p>
@@ -1834,7 +1835,7 @@
           <a:p>
             <a:fld id="{4FE021FB-C01A-47ED-8D0F-862E0EEFC0D9}" type="datetimeFigureOut">
               <a:rPr lang="en-US" smtClean="0"/>
-              <a:t>5/6/2022</a:t>
+              <a:t>5/11/2022</a:t>
             </a:fld>
             <a:endParaRPr lang="en-US"/>
           </a:p>
@@ -2111,7 +2112,7 @@
           <a:p>
             <a:fld id="{4FE021FB-C01A-47ED-8D0F-862E0EEFC0D9}" type="datetimeFigureOut">
               <a:rPr lang="en-US" smtClean="0"/>
-              <a:t>5/6/2022</a:t>
+              <a:t>5/11/2022</a:t>
             </a:fld>
             <a:endParaRPr lang="en-US"/>
           </a:p>
@@ -2368,7 +2369,7 @@
           <a:p>
             <a:fld id="{4FE021FB-C01A-47ED-8D0F-862E0EEFC0D9}" type="datetimeFigureOut">
               <a:rPr lang="en-US" smtClean="0"/>
-              <a:t>5/6/2022</a:t>
+              <a:t>5/11/2022</a:t>
             </a:fld>
             <a:endParaRPr lang="en-US"/>
           </a:p>
@@ -2433,9 +2434,18 @@
 <p:sldMaster xmlns:a="http://schemas.openxmlformats.org/drawingml/2006/main" xmlns:r="http://schemas.openxmlformats.org/officeDocument/2006/relationships" xmlns:p="http://schemas.openxmlformats.org/presentationml/2006/main">
   <p:cSld>
     <p:bg>
-      <p:bgRef idx="1001">
-        <a:schemeClr val="bg1"/>
-      </p:bgRef>
+      <p:bgPr>
+        <a:blipFill dpi="0" rotWithShape="1">
+          <a:blip r:embed="rId13">
+            <a:lum/>
+          </a:blip>
+          <a:srcRect/>
+          <a:stretch>
+            <a:fillRect l="-10000" r="-30000"/>
+          </a:stretch>
+        </a:blipFill>
+        <a:effectLst/>
+      </p:bgPr>
     </p:bg>
     <p:spTree>
       <p:nvGrpSpPr>
@@ -2581,7 +2591,7 @@
           <a:p>
             <a:fld id="{4FE021FB-C01A-47ED-8D0F-862E0EEFC0D9}" type="datetimeFigureOut">
               <a:rPr lang="en-US" smtClean="0"/>
-              <a:t>5/6/2022</a:t>
+              <a:t>5/11/2022</a:t>
             </a:fld>
             <a:endParaRPr lang="en-US"/>
           </a:p>
@@ -3002,9 +3012,17 @@
             <p:ph type="ctrTitle"/>
           </p:nvPr>
         </p:nvSpPr>
-        <p:spPr/>
-        <p:txBody>
-          <a:bodyPr/>
+        <p:spPr>
+          <a:xfrm>
+            <a:off x="2943841" y="2058690"/>
+            <a:ext cx="6304317" cy="1197272"/>
+          </a:xfrm>
+          <a:noFill/>
+        </p:spPr>
+        <p:txBody>
+          <a:bodyPr>
+            <a:normAutofit/>
+          </a:bodyPr>
           <a:lstStyle/>
           <a:p>
             <a:r>
@@ -3037,7 +3055,19 @@
           <a:p>
             <a:r>
               <a:rPr lang="en-US" dirty="0"/>
-              <a:t>Project Presented by Luke and Lauren</a:t>
+              <a:t>Project created by </a:t>
+            </a:r>
+          </a:p>
+          <a:p>
+            <a:r>
+              <a:rPr lang="en-US" dirty="0"/>
+              <a:t>Luke Parker</a:t>
+            </a:r>
+          </a:p>
+          <a:p>
+            <a:r>
+              <a:rPr lang="en-US" dirty="0"/>
+              <a:t>Lauren Young</a:t>
             </a:r>
           </a:p>
         </p:txBody>
@@ -3077,7 +3107,7 @@
           <p:cNvPr id="2" name="Title 1">
             <a:extLst>
               <a:ext uri="{FF2B5EF4-FFF2-40B4-BE49-F238E27FC236}">
-                <a16:creationId xmlns:a16="http://schemas.microsoft.com/office/drawing/2014/main" id="{3CFC7D2F-85E7-0B46-D29E-3D240E33CE01}"/>
+                <a16:creationId xmlns:a16="http://schemas.microsoft.com/office/drawing/2014/main" id="{C98B5AAA-3338-BF7B-9DDB-1D664EF7AEC8}"/>
               </a:ext>
             </a:extLst>
           </p:cNvPr>
@@ -3095,12 +3125,8 @@
           <a:p>
             <a:r>
               <a:rPr lang="en-US" dirty="0"/>
-              <a:t>Location</a:t>
-            </a:r>
-            <a:br>
-              <a:rPr lang="en-US" dirty="0"/>
-            </a:br>
-            <a:endParaRPr lang="en-US" dirty="0"/>
+              <a:t>Customer</a:t>
+            </a:r>
           </a:p>
         </p:txBody>
       </p:sp>
@@ -3109,7 +3135,7 @@
           <p:cNvPr id="3" name="Content Placeholder 2">
             <a:extLst>
               <a:ext uri="{FF2B5EF4-FFF2-40B4-BE49-F238E27FC236}">
-                <a16:creationId xmlns:a16="http://schemas.microsoft.com/office/drawing/2014/main" id="{C9068E03-828E-7F12-97BD-90F9CB187FBB}"/>
+                <a16:creationId xmlns:a16="http://schemas.microsoft.com/office/drawing/2014/main" id="{4C4B0F0F-91BF-CF30-EE49-A31382816E61}"/>
               </a:ext>
             </a:extLst>
           </p:cNvPr>
@@ -3120,104 +3146,117 @@
             <p:ph idx="1"/>
           </p:nvPr>
         </p:nvSpPr>
-        <p:spPr/>
-        <p:txBody>
-          <a:bodyPr>
-            <a:normAutofit fontScale="92500" lnSpcReduction="10000"/>
-          </a:bodyPr>
-          <a:lstStyle/>
-          <a:p>
-            <a:r>
-              <a:rPr lang="en-US" dirty="0"/>
+        <p:spPr>
+          <a:xfrm>
+            <a:off x="838200" y="1825625"/>
+            <a:ext cx="4167976" cy="4351338"/>
+          </a:xfrm>
+        </p:spPr>
+        <p:txBody>
+          <a:bodyPr/>
+          <a:lstStyle/>
+          <a:p>
+            <a:pPr marL="0" indent="0">
+              <a:buNone/>
+            </a:pPr>
+            <a:r>
+              <a:rPr lang="en-US" sz="2400" dirty="0"/>
               <a:t>Attributes</a:t>
             </a:r>
           </a:p>
           <a:p>
             <a:pPr lvl="1"/>
             <a:r>
-              <a:rPr lang="en-US" dirty="0"/>
+              <a:rPr lang="en-US" sz="1800" dirty="0"/>
               <a:t>Id</a:t>
             </a:r>
           </a:p>
           <a:p>
             <a:pPr lvl="1"/>
             <a:r>
-              <a:rPr lang="en-US" dirty="0"/>
-              <a:t>Name</a:t>
+              <a:rPr lang="en-US" sz="1800" dirty="0"/>
+              <a:t>FirstName</a:t>
             </a:r>
           </a:p>
           <a:p>
             <a:pPr lvl="1"/>
             <a:r>
-              <a:rPr lang="en-US" dirty="0"/>
-              <a:t>Street</a:t>
-            </a:r>
+              <a:rPr lang="en-US" sz="1800" dirty="0" err="1"/>
+              <a:t>LastName</a:t>
+            </a:r>
+            <a:endParaRPr lang="en-US" sz="1800" dirty="0"/>
           </a:p>
           <a:p>
             <a:pPr lvl="1"/>
             <a:r>
-              <a:rPr lang="en-US" dirty="0"/>
-              <a:t>City</a:t>
+              <a:rPr lang="en-US" sz="1800" dirty="0"/>
+              <a:t>Phone</a:t>
             </a:r>
           </a:p>
           <a:p>
             <a:pPr lvl="1"/>
             <a:r>
-              <a:rPr lang="en-US" dirty="0"/>
-              <a:t>Capacity</a:t>
+              <a:rPr lang="en-US" sz="1800" dirty="0"/>
+              <a:t>Email</a:t>
+            </a:r>
+          </a:p>
+          <a:p>
+            <a:pPr marL="0" indent="0">
+              <a:buNone/>
+            </a:pPr>
+            <a:r>
+              <a:rPr lang="en-US" sz="2400" dirty="0"/>
+              <a:t>Constraints</a:t>
             </a:r>
           </a:p>
           <a:p>
             <a:pPr lvl="1"/>
             <a:r>
-              <a:rPr lang="en-US" dirty="0" err="1"/>
-              <a:t>OpenTime</a:t>
-            </a:r>
-            <a:endParaRPr lang="en-US" dirty="0"/>
-          </a:p>
-          <a:p>
-            <a:pPr lvl="1"/>
-            <a:r>
-              <a:rPr lang="en-US" dirty="0" err="1"/>
-              <a:t>CloseTime</a:t>
-            </a:r>
-            <a:endParaRPr lang="en-US" dirty="0"/>
-          </a:p>
-          <a:p>
-            <a:r>
-              <a:rPr lang="en-US" dirty="0"/>
-              <a:t>Constraints</a:t>
-            </a:r>
-          </a:p>
-          <a:p>
-            <a:pPr lvl="1"/>
-            <a:r>
-              <a:rPr lang="en-US" dirty="0"/>
-              <a:t>Location must have 1 and only 1 Brand</a:t>
-            </a:r>
-          </a:p>
-          <a:p>
-            <a:pPr lvl="1"/>
-            <a:r>
-              <a:rPr lang="en-US" dirty="0"/>
-              <a:t>Location may have 0 or more Reservations</a:t>
-            </a:r>
-          </a:p>
-          <a:p>
-            <a:pPr marL="457200" lvl="1" indent="0">
-              <a:buNone/>
-            </a:pPr>
-            <a:r>
-              <a:rPr lang="en-US" dirty="0"/>
-              <a:t>	</a:t>
-            </a:r>
-          </a:p>
-        </p:txBody>
-      </p:sp>
+              <a:rPr lang="en-US" sz="1800" dirty="0"/>
+              <a:t>Can have 0 or many Reservations</a:t>
+            </a:r>
+          </a:p>
+        </p:txBody>
+      </p:sp>
+      <p:pic>
+        <p:nvPicPr>
+          <p:cNvPr id="5" name="Picture 4">
+            <a:extLst>
+              <a:ext uri="{FF2B5EF4-FFF2-40B4-BE49-F238E27FC236}">
+                <a16:creationId xmlns:a16="http://schemas.microsoft.com/office/drawing/2014/main" id="{CC796400-9D6F-43EC-83E4-38D5184DBE7E}"/>
+              </a:ext>
+            </a:extLst>
+          </p:cNvPr>
+          <p:cNvPicPr>
+            <a:picLocks noChangeAspect="1"/>
+          </p:cNvPicPr>
+          <p:nvPr/>
+        </p:nvPicPr>
+        <p:blipFill>
+          <a:blip r:embed="rId2"/>
+          <a:stretch>
+            <a:fillRect/>
+          </a:stretch>
+        </p:blipFill>
+        <p:spPr>
+          <a:xfrm>
+            <a:off x="5675933" y="1495155"/>
+            <a:ext cx="5010849" cy="3867690"/>
+          </a:xfrm>
+          <a:prstGeom prst="rect">
+            <a:avLst/>
+          </a:prstGeom>
+          <a:ln w="28575">
+            <a:solidFill>
+              <a:schemeClr val="bg2"/>
+            </a:solidFill>
+          </a:ln>
+        </p:spPr>
+      </p:pic>
     </p:spTree>
     <p:extLst>
       <p:ext uri="{BB962C8B-B14F-4D97-AF65-F5344CB8AC3E}">
-        <p14:creationId xmlns:p14="http://schemas.microsoft.com/office/powerpoint/2010/main" val="1249281634"/>
+        <p14:creationId xmlns:p14="http://schemas.microsoft.com/office/powerpoint/2010/main" val="3879146880"/>
       </p:ext>
     </p:extLst>
   </p:cSld>
@@ -3249,7 +3288,7 @@
           <p:cNvPr id="2" name="Title 1">
             <a:extLst>
               <a:ext uri="{FF2B5EF4-FFF2-40B4-BE49-F238E27FC236}">
-                <a16:creationId xmlns:a16="http://schemas.microsoft.com/office/drawing/2014/main" id="{25F9394A-0823-0D58-D59C-DF7F77E5E8B4}"/>
+                <a16:creationId xmlns:a16="http://schemas.microsoft.com/office/drawing/2014/main" id="{3CFC7D2F-85E7-0B46-D29E-3D240E33CE01}"/>
               </a:ext>
             </a:extLst>
           </p:cNvPr>
@@ -3267,8 +3306,12 @@
           <a:p>
             <a:r>
               <a:rPr lang="en-US" dirty="0"/>
-              <a:t>Reservation</a:t>
-            </a:r>
+              <a:t>Location</a:t>
+            </a:r>
+            <a:br>
+              <a:rPr lang="en-US" dirty="0"/>
+            </a:br>
+            <a:endParaRPr lang="en-US" dirty="0"/>
           </a:p>
         </p:txBody>
       </p:sp>
@@ -3277,7 +3320,7 @@
           <p:cNvPr id="3" name="Content Placeholder 2">
             <a:extLst>
               <a:ext uri="{FF2B5EF4-FFF2-40B4-BE49-F238E27FC236}">
-                <a16:creationId xmlns:a16="http://schemas.microsoft.com/office/drawing/2014/main" id="{120F4257-7EE1-17B0-0FB7-DFB90D06D387}"/>
+                <a16:creationId xmlns:a16="http://schemas.microsoft.com/office/drawing/2014/main" id="{C9068E03-828E-7F12-97BD-90F9CB187FBB}"/>
               </a:ext>
             </a:extLst>
           </p:cNvPr>
@@ -3288,88 +3331,150 @@
             <p:ph idx="1"/>
           </p:nvPr>
         </p:nvSpPr>
-        <p:spPr/>
-        <p:txBody>
-          <a:bodyPr/>
-          <a:lstStyle/>
-          <a:p>
+        <p:spPr>
+          <a:xfrm>
+            <a:off x="838200" y="1450660"/>
+            <a:ext cx="3615388" cy="4351338"/>
+          </a:xfrm>
+        </p:spPr>
+        <p:txBody>
+          <a:bodyPr>
+            <a:normAutofit lnSpcReduction="10000"/>
+          </a:bodyPr>
+          <a:lstStyle/>
+          <a:p>
+            <a:pPr marL="0" indent="0">
+              <a:buNone/>
+            </a:pPr>
+            <a:r>
+              <a:rPr lang="en-US" sz="2400" dirty="0"/>
+              <a:t>Attributes</a:t>
+            </a:r>
+          </a:p>
+          <a:p>
+            <a:pPr lvl="1"/>
+            <a:r>
+              <a:rPr lang="en-US" sz="1900" dirty="0"/>
+              <a:t>Id</a:t>
+            </a:r>
+          </a:p>
+          <a:p>
+            <a:pPr lvl="1"/>
+            <a:r>
+              <a:rPr lang="en-US" sz="1900" dirty="0"/>
+              <a:t>Name</a:t>
+            </a:r>
+          </a:p>
+          <a:p>
+            <a:pPr lvl="1"/>
+            <a:r>
+              <a:rPr lang="en-US" sz="1900" dirty="0"/>
+              <a:t>Street</a:t>
+            </a:r>
+          </a:p>
+          <a:p>
+            <a:pPr lvl="1"/>
+            <a:r>
+              <a:rPr lang="en-US" sz="1900" dirty="0"/>
+              <a:t>City</a:t>
+            </a:r>
+          </a:p>
+          <a:p>
+            <a:pPr lvl="1"/>
+            <a:r>
+              <a:rPr lang="en-US" sz="1900" dirty="0"/>
+              <a:t>Capacity</a:t>
+            </a:r>
+          </a:p>
+          <a:p>
+            <a:pPr lvl="1"/>
+            <a:r>
+              <a:rPr lang="en-US" sz="1900" dirty="0" err="1"/>
+              <a:t>OpenTime</a:t>
+            </a:r>
+            <a:endParaRPr lang="en-US" sz="1900" dirty="0"/>
+          </a:p>
+          <a:p>
+            <a:pPr lvl="1"/>
+            <a:r>
+              <a:rPr lang="en-US" sz="1900" dirty="0" err="1"/>
+              <a:t>CloseTime</a:t>
+            </a:r>
+            <a:endParaRPr lang="en-US" sz="1900" dirty="0"/>
+          </a:p>
+          <a:p>
+            <a:pPr marL="0" indent="0">
+              <a:buNone/>
+            </a:pPr>
+            <a:r>
+              <a:rPr lang="en-US" sz="2400" dirty="0"/>
+              <a:t>Constraints</a:t>
+            </a:r>
+          </a:p>
+          <a:p>
+            <a:pPr lvl="1"/>
+            <a:r>
+              <a:rPr lang="en-US" sz="1800" dirty="0"/>
+              <a:t>Location must have 1 and only 1 Brand</a:t>
+            </a:r>
+          </a:p>
+          <a:p>
+            <a:pPr lvl="1"/>
+            <a:r>
+              <a:rPr lang="en-US" sz="1800" dirty="0"/>
+              <a:t>Location may have 0 or more Reservations</a:t>
+            </a:r>
+          </a:p>
+          <a:p>
+            <a:pPr marL="457200" lvl="1" indent="0">
+              <a:buNone/>
+            </a:pPr>
             <a:r>
               <a:rPr lang="en-US" dirty="0"/>
-              <a:t>Attributes</a:t>
-            </a:r>
-          </a:p>
-          <a:p>
-            <a:pPr lvl="1"/>
-            <a:r>
-              <a:rPr lang="en-US" dirty="0"/>
-              <a:t>Id</a:t>
-            </a:r>
-          </a:p>
-          <a:p>
-            <a:pPr lvl="1"/>
-            <a:r>
-              <a:rPr lang="en-US" dirty="0"/>
-              <a:t>Length</a:t>
-            </a:r>
-          </a:p>
-          <a:p>
-            <a:pPr lvl="1"/>
-            <a:r>
-              <a:rPr lang="en-US" dirty="0" err="1"/>
-              <a:t>PartySize</a:t>
-            </a:r>
-            <a:endParaRPr lang="en-US" dirty="0"/>
-          </a:p>
-          <a:p>
-            <a:pPr lvl="1"/>
-            <a:r>
-              <a:rPr lang="en-US" dirty="0" err="1"/>
-              <a:t>ReservationTime</a:t>
-            </a:r>
-            <a:endParaRPr lang="en-US" dirty="0"/>
-          </a:p>
-          <a:p>
-            <a:pPr lvl="1"/>
-            <a:r>
-              <a:rPr lang="en-US" dirty="0" err="1"/>
-              <a:t>CustomerId</a:t>
-            </a:r>
-            <a:endParaRPr lang="en-US" dirty="0"/>
-          </a:p>
-          <a:p>
-            <a:pPr lvl="1"/>
-            <a:r>
-              <a:rPr lang="en-US" dirty="0" err="1"/>
-              <a:t>LocationId</a:t>
-            </a:r>
-            <a:endParaRPr lang="en-US" dirty="0"/>
-          </a:p>
-          <a:p>
-            <a:r>
-              <a:rPr lang="en-US" dirty="0"/>
-              <a:t>Constraints</a:t>
-            </a:r>
-          </a:p>
-          <a:p>
-            <a:pPr lvl="1"/>
-            <a:r>
-              <a:rPr lang="en-US" dirty="0"/>
-              <a:t>Must have 1 and only 1 Customer</a:t>
-            </a:r>
-          </a:p>
-          <a:p>
-            <a:pPr lvl="1"/>
-            <a:r>
-              <a:rPr lang="en-US" dirty="0"/>
-              <a:t>Must have 1 and only 1 Location</a:t>
-            </a:r>
-          </a:p>
-        </p:txBody>
-      </p:sp>
+              <a:t>	</a:t>
+            </a:r>
+          </a:p>
+        </p:txBody>
+      </p:sp>
+      <p:pic>
+        <p:nvPicPr>
+          <p:cNvPr id="5" name="Picture 4">
+            <a:extLst>
+              <a:ext uri="{FF2B5EF4-FFF2-40B4-BE49-F238E27FC236}">
+                <a16:creationId xmlns:a16="http://schemas.microsoft.com/office/drawing/2014/main" id="{774834C0-CC1F-476C-AABD-F005C8C64FF9}"/>
+              </a:ext>
+            </a:extLst>
+          </p:cNvPr>
+          <p:cNvPicPr>
+            <a:picLocks noChangeAspect="1"/>
+          </p:cNvPicPr>
+          <p:nvPr/>
+        </p:nvPicPr>
+        <p:blipFill>
+          <a:blip r:embed="rId2"/>
+          <a:stretch>
+            <a:fillRect/>
+          </a:stretch>
+        </p:blipFill>
+        <p:spPr>
+          <a:xfrm>
+            <a:off x="4902900" y="1427542"/>
+            <a:ext cx="6001588" cy="4134427"/>
+          </a:xfrm>
+          <a:prstGeom prst="rect">
+            <a:avLst/>
+          </a:prstGeom>
+          <a:ln w="28575">
+            <a:solidFill>
+              <a:schemeClr val="bg2"/>
+            </a:solidFill>
+          </a:ln>
+        </p:spPr>
+      </p:pic>
     </p:spTree>
     <p:extLst>
       <p:ext uri="{BB962C8B-B14F-4D97-AF65-F5344CB8AC3E}">
-        <p14:creationId xmlns:p14="http://schemas.microsoft.com/office/powerpoint/2010/main" val="2599474371"/>
+        <p14:creationId xmlns:p14="http://schemas.microsoft.com/office/powerpoint/2010/main" val="1249281634"/>
       </p:ext>
     </p:extLst>
   </p:cSld>
@@ -3401,7 +3506,7 @@
           <p:cNvPr id="2" name="Title 1">
             <a:extLst>
               <a:ext uri="{FF2B5EF4-FFF2-40B4-BE49-F238E27FC236}">
-                <a16:creationId xmlns:a16="http://schemas.microsoft.com/office/drawing/2014/main" id="{D9232C1A-4262-3EA8-06DA-F47CCA1B47CE}"/>
+                <a16:creationId xmlns:a16="http://schemas.microsoft.com/office/drawing/2014/main" id="{25F9394A-0823-0D58-D59C-DF7F77E5E8B4}"/>
               </a:ext>
             </a:extLst>
           </p:cNvPr>
@@ -3419,7 +3524,7 @@
           <a:p>
             <a:r>
               <a:rPr lang="en-US" dirty="0"/>
-              <a:t>Use Cases </a:t>
+              <a:t>Reservation</a:t>
             </a:r>
           </a:p>
         </p:txBody>
@@ -3429,7 +3534,7 @@
           <p:cNvPr id="3" name="Content Placeholder 2">
             <a:extLst>
               <a:ext uri="{FF2B5EF4-FFF2-40B4-BE49-F238E27FC236}">
-                <a16:creationId xmlns:a16="http://schemas.microsoft.com/office/drawing/2014/main" id="{02C22B86-B9AA-ACD8-208A-18D4CD4BF2DE}"/>
+                <a16:creationId xmlns:a16="http://schemas.microsoft.com/office/drawing/2014/main" id="{120F4257-7EE1-17B0-0FB7-DFB90D06D387}"/>
               </a:ext>
             </a:extLst>
           </p:cNvPr>
@@ -3440,81 +3545,134 @@
             <p:ph idx="1"/>
           </p:nvPr>
         </p:nvSpPr>
-        <p:spPr/>
-        <p:txBody>
-          <a:bodyPr>
-            <a:normAutofit/>
-          </a:bodyPr>
-          <a:lstStyle/>
-          <a:p>
-            <a:r>
-              <a:rPr lang="en-US" dirty="0"/>
-              <a:t>Brand manages current and new Location.</a:t>
-            </a:r>
-          </a:p>
-          <a:p>
-            <a:r>
-              <a:rPr lang="en-US" dirty="0"/>
-              <a:t>Customer calls to make reservation. Host adds customer and reservation.</a:t>
-            </a:r>
-          </a:p>
-          <a:p>
-            <a:r>
-              <a:rPr lang="en-US" dirty="0"/>
-              <a:t>Manager wants list of reservations at certain location on certain date.</a:t>
-            </a:r>
-          </a:p>
-          <a:p>
-            <a:r>
-              <a:rPr lang="en-US" dirty="0"/>
-              <a:t>Industry potential</a:t>
+        <p:spPr>
+          <a:xfrm>
+            <a:off x="838200" y="1786155"/>
+            <a:ext cx="4016672" cy="4351338"/>
+          </a:xfrm>
+        </p:spPr>
+        <p:txBody>
+          <a:bodyPr/>
+          <a:lstStyle/>
+          <a:p>
+            <a:pPr marL="0" indent="0">
+              <a:buNone/>
+            </a:pPr>
+            <a:r>
+              <a:rPr lang="en-US" sz="2400" dirty="0"/>
+              <a:t>Attributes</a:t>
             </a:r>
           </a:p>
           <a:p>
             <a:pPr lvl="1"/>
             <a:r>
-              <a:rPr lang="en-US" dirty="0"/>
-              <a:t>Dental Offices</a:t>
+              <a:rPr lang="en-US" sz="1800" dirty="0"/>
+              <a:t>Id</a:t>
             </a:r>
           </a:p>
           <a:p>
             <a:pPr lvl="1"/>
             <a:r>
-              <a:rPr lang="en-US" dirty="0"/>
-              <a:t>Gym Classes</a:t>
+              <a:rPr lang="en-US" sz="1800" dirty="0"/>
+              <a:t>Length</a:t>
             </a:r>
           </a:p>
           <a:p>
             <a:pPr lvl="1"/>
             <a:r>
-              <a:rPr lang="en-US" dirty="0"/>
-              <a:t>Appointment Driven Services</a:t>
-            </a:r>
-          </a:p>
-          <a:p>
-            <a:pPr marL="457200" lvl="1" indent="0">
+              <a:rPr lang="en-US" sz="1800" dirty="0" err="1"/>
+              <a:t>PartySize</a:t>
+            </a:r>
+            <a:endParaRPr lang="en-US" sz="1800" dirty="0"/>
+          </a:p>
+          <a:p>
+            <a:pPr lvl="1"/>
+            <a:r>
+              <a:rPr lang="en-US" sz="1800" dirty="0" err="1"/>
+              <a:t>ReservationTime</a:t>
+            </a:r>
+            <a:endParaRPr lang="en-US" sz="1800" dirty="0"/>
+          </a:p>
+          <a:p>
+            <a:pPr lvl="1"/>
+            <a:r>
+              <a:rPr lang="en-US" sz="1800" dirty="0" err="1"/>
+              <a:t>CustomerId</a:t>
+            </a:r>
+            <a:endParaRPr lang="en-US" sz="1800" dirty="0"/>
+          </a:p>
+          <a:p>
+            <a:pPr lvl="1"/>
+            <a:r>
+              <a:rPr lang="en-US" sz="1800" dirty="0" err="1"/>
+              <a:t>LocationId</a:t>
+            </a:r>
+            <a:endParaRPr lang="en-US" sz="1800" dirty="0"/>
+          </a:p>
+          <a:p>
+            <a:pPr marL="0" indent="0">
               <a:buNone/>
             </a:pPr>
-            <a:endParaRPr lang="en-US" dirty="0"/>
-          </a:p>
-          <a:p>
-            <a:pPr marL="457200" lvl="1" indent="0">
-              <a:buNone/>
-            </a:pPr>
-            <a:endParaRPr lang="en-US" dirty="0"/>
-          </a:p>
-          <a:p>
-            <a:pPr marL="0" indent="0">
-              <a:buNone/>
-            </a:pPr>
-            <a:endParaRPr lang="en-US" dirty="0"/>
-          </a:p>
-        </p:txBody>
-      </p:sp>
+            <a:r>
+              <a:rPr lang="en-US" sz="2400" dirty="0"/>
+              <a:t>Constraints</a:t>
+            </a:r>
+          </a:p>
+          <a:p>
+            <a:pPr lvl="1"/>
+            <a:r>
+              <a:rPr lang="en-US" sz="1800" dirty="0"/>
+              <a:t>Must have 1 and only 1 Customer</a:t>
+            </a:r>
+          </a:p>
+          <a:p>
+            <a:pPr lvl="1"/>
+            <a:r>
+              <a:rPr lang="en-US" sz="1800" dirty="0"/>
+              <a:t>Must have 1 and only 1 Location</a:t>
+            </a:r>
+          </a:p>
+        </p:txBody>
+      </p:sp>
+      <p:pic>
+        <p:nvPicPr>
+          <p:cNvPr id="5" name="Picture 4">
+            <a:extLst>
+              <a:ext uri="{FF2B5EF4-FFF2-40B4-BE49-F238E27FC236}">
+                <a16:creationId xmlns:a16="http://schemas.microsoft.com/office/drawing/2014/main" id="{59358002-E87A-4195-96A0-C193D87233EE}"/>
+              </a:ext>
+            </a:extLst>
+          </p:cNvPr>
+          <p:cNvPicPr>
+            <a:picLocks noChangeAspect="1"/>
+          </p:cNvPicPr>
+          <p:nvPr/>
+        </p:nvPicPr>
+        <p:blipFill>
+          <a:blip r:embed="rId2"/>
+          <a:stretch>
+            <a:fillRect/>
+          </a:stretch>
+        </p:blipFill>
+        <p:spPr>
+          <a:xfrm>
+            <a:off x="5454097" y="1423707"/>
+            <a:ext cx="5296639" cy="4010585"/>
+          </a:xfrm>
+          <a:prstGeom prst="rect">
+            <a:avLst/>
+          </a:prstGeom>
+          <a:ln w="28575">
+            <a:solidFill>
+              <a:schemeClr val="bg2"/>
+            </a:solidFill>
+          </a:ln>
+        </p:spPr>
+      </p:pic>
     </p:spTree>
     <p:extLst>
       <p:ext uri="{BB962C8B-B14F-4D97-AF65-F5344CB8AC3E}">
-        <p14:creationId xmlns:p14="http://schemas.microsoft.com/office/powerpoint/2010/main" val="2943732899"/>
+        <p14:creationId xmlns:p14="http://schemas.microsoft.com/office/powerpoint/2010/main" val="2599474371"/>
       </p:ext>
     </p:extLst>
   </p:cSld>
@@ -3546,7 +3704,7 @@
           <p:cNvPr id="2" name="Title 1">
             <a:extLst>
               <a:ext uri="{FF2B5EF4-FFF2-40B4-BE49-F238E27FC236}">
-                <a16:creationId xmlns:a16="http://schemas.microsoft.com/office/drawing/2014/main" id="{2B917B24-8952-DFD2-F356-E1C669D6B41E}"/>
+                <a16:creationId xmlns:a16="http://schemas.microsoft.com/office/drawing/2014/main" id="{D9232C1A-4262-3EA8-06DA-F47CCA1B47CE}"/>
               </a:ext>
             </a:extLst>
           </p:cNvPr>
@@ -3564,7 +3722,7 @@
           <a:p>
             <a:r>
               <a:rPr lang="en-US" dirty="0"/>
-              <a:t>Now for a demonstration…</a:t>
+              <a:t>Use Cases </a:t>
             </a:r>
           </a:p>
         </p:txBody>
@@ -3574,7 +3732,7 @@
           <p:cNvPr id="3" name="Content Placeholder 2">
             <a:extLst>
               <a:ext uri="{FF2B5EF4-FFF2-40B4-BE49-F238E27FC236}">
-                <a16:creationId xmlns:a16="http://schemas.microsoft.com/office/drawing/2014/main" id="{1325056E-FAA3-52B2-6BBF-40CC5491F96B}"/>
+                <a16:creationId xmlns:a16="http://schemas.microsoft.com/office/drawing/2014/main" id="{02C22B86-B9AA-ACD8-208A-18D4CD4BF2DE}"/>
               </a:ext>
             </a:extLst>
           </p:cNvPr>
@@ -3587,17 +3745,79 @@
         </p:nvSpPr>
         <p:spPr/>
         <p:txBody>
-          <a:bodyPr/>
-          <a:lstStyle/>
-          <a:p>
-            <a:endParaRPr lang="en-US"/>
+          <a:bodyPr>
+            <a:normAutofit/>
+          </a:bodyPr>
+          <a:lstStyle/>
+          <a:p>
+            <a:r>
+              <a:rPr lang="en-US" sz="2400" dirty="0"/>
+              <a:t>You get a call from a Brand manager notifying you of a new construction nearing completion. They want you to add the new Location to the system so they can begin taking reservations soon.</a:t>
+            </a:r>
+          </a:p>
+          <a:p>
+            <a:endParaRPr lang="en-US" sz="1000" dirty="0"/>
+          </a:p>
+          <a:p>
+            <a:r>
+              <a:rPr lang="en-US" sz="2400" dirty="0"/>
+              <a:t>A Customer calls and wants to cancel their existing Reservation. They would like to make a new Reservation at a different date and Location. You can either delete and recreate the Reservation or update the existing Reservation. </a:t>
+            </a:r>
+          </a:p>
+          <a:p>
+            <a:endParaRPr lang="en-US" sz="1000" dirty="0"/>
+          </a:p>
+          <a:p>
+            <a:r>
+              <a:rPr lang="en-US" sz="2400" dirty="0"/>
+              <a:t>Industry potential</a:t>
+            </a:r>
+          </a:p>
+          <a:p>
+            <a:pPr lvl="1"/>
+            <a:r>
+              <a:rPr lang="en-US" sz="1800" dirty="0"/>
+              <a:t>Dental Offices</a:t>
+            </a:r>
+          </a:p>
+          <a:p>
+            <a:pPr lvl="1"/>
+            <a:r>
+              <a:rPr lang="en-US" sz="1800" dirty="0"/>
+              <a:t>Gym Classes</a:t>
+            </a:r>
+          </a:p>
+          <a:p>
+            <a:pPr lvl="1"/>
+            <a:r>
+              <a:rPr lang="en-US" sz="1800" dirty="0"/>
+              <a:t>Appointment Driven Services</a:t>
+            </a:r>
+          </a:p>
+          <a:p>
+            <a:pPr marL="457200" lvl="1" indent="0">
+              <a:buNone/>
+            </a:pPr>
+            <a:endParaRPr lang="en-US" dirty="0"/>
+          </a:p>
+          <a:p>
+            <a:pPr marL="457200" lvl="1" indent="0">
+              <a:buNone/>
+            </a:pPr>
+            <a:endParaRPr lang="en-US" dirty="0"/>
+          </a:p>
+          <a:p>
+            <a:pPr marL="0" indent="0">
+              <a:buNone/>
+            </a:pPr>
+            <a:endParaRPr lang="en-US" dirty="0"/>
           </a:p>
         </p:txBody>
       </p:sp>
     </p:spTree>
     <p:extLst>
       <p:ext uri="{BB962C8B-B14F-4D97-AF65-F5344CB8AC3E}">
-        <p14:creationId xmlns:p14="http://schemas.microsoft.com/office/powerpoint/2010/main" val="2830330582"/>
+        <p14:creationId xmlns:p14="http://schemas.microsoft.com/office/powerpoint/2010/main" val="2943732899"/>
       </p:ext>
     </p:extLst>
   </p:cSld>
@@ -3629,6 +3849,64 @@
           <p:cNvPr id="2" name="Title 1">
             <a:extLst>
               <a:ext uri="{FF2B5EF4-FFF2-40B4-BE49-F238E27FC236}">
+                <a16:creationId xmlns:a16="http://schemas.microsoft.com/office/drawing/2014/main" id="{2B917B24-8952-DFD2-F356-E1C669D6B41E}"/>
+              </a:ext>
+            </a:extLst>
+          </p:cNvPr>
+          <p:cNvSpPr>
+            <a:spLocks noGrp="1"/>
+          </p:cNvSpPr>
+          <p:nvPr>
+            <p:ph type="title"/>
+          </p:nvPr>
+        </p:nvSpPr>
+        <p:spPr/>
+        <p:txBody>
+          <a:bodyPr/>
+          <a:lstStyle/>
+          <a:p>
+            <a:r>
+              <a:rPr lang="en-US" dirty="0"/>
+              <a:t>Now for a demonstration…</a:t>
+            </a:r>
+          </a:p>
+        </p:txBody>
+      </p:sp>
+    </p:spTree>
+    <p:extLst>
+      <p:ext uri="{BB962C8B-B14F-4D97-AF65-F5344CB8AC3E}">
+        <p14:creationId xmlns:p14="http://schemas.microsoft.com/office/powerpoint/2010/main" val="2830330582"/>
+      </p:ext>
+    </p:extLst>
+  </p:cSld>
+  <p:clrMapOvr>
+    <a:masterClrMapping/>
+  </p:clrMapOvr>
+</p:sld>
+</file>
+
+<file path=ppt/slides/slide15.xml><?xml version="1.0" encoding="utf-8"?>
+<p:sld xmlns:a="http://schemas.openxmlformats.org/drawingml/2006/main" xmlns:r="http://schemas.openxmlformats.org/officeDocument/2006/relationships" xmlns:p="http://schemas.openxmlformats.org/presentationml/2006/main">
+  <p:cSld>
+    <p:spTree>
+      <p:nvGrpSpPr>
+        <p:cNvPr id="1" name=""/>
+        <p:cNvGrpSpPr/>
+        <p:nvPr/>
+      </p:nvGrpSpPr>
+      <p:grpSpPr>
+        <a:xfrm>
+          <a:off x="0" y="0"/>
+          <a:ext cx="0" cy="0"/>
+          <a:chOff x="0" y="0"/>
+          <a:chExt cx="0" cy="0"/>
+        </a:xfrm>
+      </p:grpSpPr>
+      <p:sp>
+        <p:nvSpPr>
+          <p:cNvPr id="2" name="Title 1">
+            <a:extLst>
+              <a:ext uri="{FF2B5EF4-FFF2-40B4-BE49-F238E27FC236}">
                 <a16:creationId xmlns:a16="http://schemas.microsoft.com/office/drawing/2014/main" id="{DDD37626-8421-DD1D-4792-F8474E549760}"/>
               </a:ext>
             </a:extLst>
@@ -3673,29 +3951,44 @@
           <a:bodyPr/>
           <a:lstStyle/>
           <a:p>
-            <a:r>
-              <a:rPr lang="en-US" dirty="0"/>
+            <a:pPr marL="0" indent="0">
+              <a:buNone/>
+            </a:pPr>
+            <a:r>
+              <a:rPr lang="en-US" sz="2400" dirty="0"/>
               <a:t>Potential Expansions to Product Functionality</a:t>
             </a:r>
           </a:p>
           <a:p>
-            <a:pPr lvl="1"/>
-            <a:r>
-              <a:rPr lang="en-US" dirty="0"/>
-              <a:t>Search Locations by service type</a:t>
-            </a:r>
-          </a:p>
-          <a:p>
-            <a:pPr lvl="1"/>
-            <a:r>
-              <a:rPr lang="en-US" dirty="0"/>
-              <a:t>Provide criteria for Customers</a:t>
-            </a:r>
-          </a:p>
-          <a:p>
-            <a:pPr lvl="1"/>
-            <a:r>
-              <a:rPr lang="en-US" dirty="0"/>
+            <a:pPr lvl="1">
+              <a:lnSpc>
+                <a:spcPct val="150000"/>
+              </a:lnSpc>
+            </a:pPr>
+            <a:r>
+              <a:rPr lang="en-US" sz="1800" dirty="0"/>
+              <a:t>Search Brands by service type</a:t>
+            </a:r>
+          </a:p>
+          <a:p>
+            <a:pPr lvl="1">
+              <a:lnSpc>
+                <a:spcPct val="150000"/>
+              </a:lnSpc>
+            </a:pPr>
+            <a:r>
+              <a:rPr lang="en-US" sz="1800" dirty="0"/>
+              <a:t>Expand Customer class to include more data</a:t>
+            </a:r>
+          </a:p>
+          <a:p>
+            <a:pPr lvl="1">
+              <a:lnSpc>
+                <a:spcPct val="150000"/>
+              </a:lnSpc>
+            </a:pPr>
+            <a:r>
+              <a:rPr lang="en-US" sz="1800" dirty="0"/>
               <a:t>Give ability to check table availability separate from building capacity</a:t>
             </a:r>
           </a:p>
@@ -3785,67 +4078,106 @@
             <p:ph idx="1"/>
           </p:nvPr>
         </p:nvSpPr>
-        <p:spPr/>
+        <p:spPr>
+          <a:xfrm>
+            <a:off x="838200" y="1690688"/>
+            <a:ext cx="9785944" cy="3657600"/>
+          </a:xfrm>
+        </p:spPr>
         <p:txBody>
           <a:bodyPr>
-            <a:normAutofit lnSpcReduction="10000"/>
+            <a:normAutofit/>
           </a:bodyPr>
           <a:lstStyle/>
           <a:p>
+            <a:pPr marL="0" indent="0">
+              <a:lnSpc>
+                <a:spcPct val="100000"/>
+              </a:lnSpc>
+              <a:spcBef>
+                <a:spcPts val="0"/>
+              </a:spcBef>
+              <a:buNone/>
+            </a:pPr>
             <a:r>
               <a:rPr lang="en-US" dirty="0"/>
-              <a:t>A restaurant just added some locations, so it needs a way to manage reservations for multiple locations. The hostess needs to be able to create, cancel, or update reservations. Also, if the location is at capacity, or the reservation is scheduled outside of normal operating hours, then the reservation should not be allowed to be made.</a:t>
-            </a:r>
-          </a:p>
-          <a:p>
+              <a:t>A restaurant just added some locations, so it needs a way to manage reservations for multiple locations. </a:t>
+            </a:r>
+          </a:p>
+          <a:p>
+            <a:pPr marL="0" indent="0">
+              <a:lnSpc>
+                <a:spcPct val="100000"/>
+              </a:lnSpc>
+              <a:spcBef>
+                <a:spcPts val="0"/>
+              </a:spcBef>
+              <a:buNone/>
+            </a:pPr>
+            <a:endParaRPr lang="en-US" sz="1800" dirty="0"/>
+          </a:p>
+          <a:p>
+            <a:pPr marL="0" indent="0">
+              <a:lnSpc>
+                <a:spcPct val="100000"/>
+              </a:lnSpc>
+              <a:spcBef>
+                <a:spcPts val="0"/>
+              </a:spcBef>
+              <a:buNone/>
+            </a:pPr>
             <a:r>
               <a:rPr lang="en-US" dirty="0"/>
-              <a:t>Acceptance Criteria</a:t>
-            </a:r>
-          </a:p>
-          <a:p>
-            <a:pPr lvl="1"/>
+              <a:t>The hostess needs to be able to create, cancel, or update reservations. </a:t>
+            </a:r>
+          </a:p>
+          <a:p>
+            <a:pPr marL="0" indent="0">
+              <a:lnSpc>
+                <a:spcPct val="100000"/>
+              </a:lnSpc>
+              <a:spcBef>
+                <a:spcPts val="0"/>
+              </a:spcBef>
+              <a:buNone/>
+            </a:pPr>
+            <a:endParaRPr lang="en-US" sz="1800" dirty="0"/>
+          </a:p>
+          <a:p>
+            <a:pPr marL="0" indent="0">
+              <a:lnSpc>
+                <a:spcPct val="100000"/>
+              </a:lnSpc>
+              <a:spcBef>
+                <a:spcPts val="0"/>
+              </a:spcBef>
+              <a:buNone/>
+            </a:pPr>
             <a:r>
               <a:rPr lang="en-US" dirty="0"/>
-              <a:t>CRUD functionality for locations and reservations</a:t>
-            </a:r>
-          </a:p>
-          <a:p>
-            <a:pPr lvl="1"/>
-            <a:r>
-              <a:rPr lang="en-US" dirty="0"/>
-              <a:t>if the location is at capacity, don't allow the a reservation to be created</a:t>
-            </a:r>
-          </a:p>
-          <a:p>
-            <a:pPr lvl="1"/>
-            <a:r>
-              <a:rPr lang="en-US" dirty="0"/>
-              <a:t>Do not allow multiple reservations at the same time</a:t>
-            </a:r>
-          </a:p>
-          <a:p>
-            <a:pPr lvl="1"/>
-            <a:r>
-              <a:rPr lang="en-US" dirty="0"/>
-              <a:t>Do not allow reservations to occur outside of business hours</a:t>
-            </a:r>
-          </a:p>
-          <a:p>
-            <a:pPr lvl="1"/>
-            <a:r>
-              <a:rPr lang="en-US" dirty="0"/>
-              <a:t>You will need to stub out some data b/c the database has not been created yet</a:t>
+              <a:t>Also, if the location is at capacity, or the reservation is scheduled outside of normal operating hours, then the reservation should not be allowed to be made.</a:t>
             </a:r>
           </a:p>
           <a:p>
             <a:pPr marL="457200" lvl="1" indent="0">
+              <a:lnSpc>
+                <a:spcPct val="150000"/>
+              </a:lnSpc>
+              <a:spcBef>
+                <a:spcPts val="0"/>
+              </a:spcBef>
               <a:buNone/>
             </a:pPr>
             <a:endParaRPr lang="en-US" dirty="0"/>
           </a:p>
           <a:p>
             <a:pPr marL="457200" lvl="1" indent="0">
+              <a:lnSpc>
+                <a:spcPct val="150000"/>
+              </a:lnSpc>
+              <a:spcBef>
+                <a:spcPts val="0"/>
+              </a:spcBef>
               <a:buNone/>
             </a:pPr>
             <a:endParaRPr lang="en-US" dirty="0"/>
@@ -3931,12 +4263,6 @@
           <a:bodyPr/>
           <a:lstStyle/>
           <a:p>
-            <a:r>
-              <a:rPr lang="en-US" dirty="0"/>
-              <a:t>Challenges we faced</a:t>
-            </a:r>
-          </a:p>
-          <a:p>
             <a:pPr lvl="1"/>
             <a:r>
               <a:rPr lang="en-US" dirty="0"/>
@@ -3945,6 +4271,21 @@
           </a:p>
           <a:p>
             <a:pPr lvl="1"/>
+            <a:endParaRPr lang="en-US" sz="1000" dirty="0"/>
+          </a:p>
+          <a:p>
+            <a:pPr lvl="1"/>
+            <a:r>
+              <a:rPr lang="en-US" dirty="0"/>
+              <a:t>Efficiency of code for database scalability</a:t>
+            </a:r>
+          </a:p>
+          <a:p>
+            <a:pPr lvl="1"/>
+            <a:endParaRPr lang="en-US" sz="1000" dirty="0"/>
+          </a:p>
+          <a:p>
+            <a:pPr lvl="1"/>
             <a:r>
               <a:rPr lang="en-US" dirty="0"/>
               <a:t>Using the </a:t>
@@ -3960,21 +4301,14 @@
           </a:p>
           <a:p>
             <a:pPr lvl="1"/>
+            <a:endParaRPr lang="en-US" sz="1000" dirty="0"/>
+          </a:p>
+          <a:p>
+            <a:pPr lvl="1"/>
             <a:r>
               <a:rPr lang="en-US" dirty="0"/>
-              <a:t>Filtering Queries</a:t>
-            </a:r>
-          </a:p>
-          <a:p>
-            <a:pPr lvl="1"/>
-            <a:r>
-              <a:rPr lang="en-US" dirty="0"/>
-              <a:t>Efficiency of code for DB scalability</a:t>
-            </a:r>
-          </a:p>
-          <a:p>
-            <a:pPr lvl="1"/>
-            <a:endParaRPr lang="en-US" dirty="0"/>
+              <a:t>Filtering Queries to allow user friendly searching</a:t>
+            </a:r>
           </a:p>
           <a:p>
             <a:pPr lvl="1"/>
@@ -4068,9 +4402,14 @@
         </p:blipFill>
         <p:spPr>
           <a:xfrm>
-            <a:off x="4993936" y="1788735"/>
+            <a:off x="4838662" y="1691639"/>
             <a:ext cx="5884475" cy="3580067"/>
           </a:xfrm>
+          <a:ln w="28575">
+            <a:solidFill>
+              <a:schemeClr val="bg2"/>
+            </a:solidFill>
+          </a:ln>
         </p:spPr>
       </p:pic>
       <p:sp>
@@ -4087,8 +4426,8 @@
         </p:nvSpPr>
         <p:spPr>
           <a:xfrm>
-            <a:off x="1092229" y="1690688"/>
-            <a:ext cx="2887925" cy="1477328"/>
+            <a:off x="838200" y="1690688"/>
+            <a:ext cx="3312780" cy="1754326"/>
           </a:xfrm>
           <a:prstGeom prst="rect">
             <a:avLst/>
@@ -4107,15 +4446,7 @@
             </a:pPr>
             <a:r>
               <a:rPr lang="en-US" dirty="0"/>
-              <a:t>Developed </a:t>
-            </a:r>
-            <a:r>
-              <a:rPr lang="en-US" dirty="0" err="1"/>
-              <a:t>CheckOverlap</a:t>
-            </a:r>
-            <a:r>
-              <a:rPr lang="en-US" dirty="0"/>
-              <a:t> method</a:t>
+              <a:t>Developed logic to check if two reservations overlapped</a:t>
             </a:r>
           </a:p>
           <a:p>
@@ -4123,9 +4454,16 @@
               <a:buFont typeface="Arial" panose="020B0604020202020204" pitchFamily="34" charset="0"/>
               <a:buChar char="•"/>
             </a:pPr>
+            <a:endParaRPr lang="en-US" dirty="0"/>
+          </a:p>
+          <a:p>
+            <a:pPr marL="285750" indent="-285750">
+              <a:buFont typeface="Arial" panose="020B0604020202020204" pitchFamily="34" charset="0"/>
+              <a:buChar char="•"/>
+            </a:pPr>
             <a:r>
               <a:rPr lang="en-US" dirty="0"/>
-              <a:t>Encapsulated for easy reuse.</a:t>
+              <a:t>Encapsulated in method for easy reuse.</a:t>
             </a:r>
           </a:p>
           <a:p>
@@ -4159,12 +4497,17 @@
         </p:blipFill>
         <p:spPr>
           <a:xfrm>
-            <a:off x="4993936" y="5466849"/>
+            <a:off x="4838662" y="5369753"/>
             <a:ext cx="4627680" cy="1123122"/>
           </a:xfrm>
           <a:prstGeom prst="rect">
             <a:avLst/>
           </a:prstGeom>
+          <a:ln w="28575">
+            <a:solidFill>
+              <a:schemeClr val="bg2"/>
+            </a:solidFill>
+          </a:ln>
         </p:spPr>
       </p:pic>
     </p:spTree>
@@ -4202,7 +4545,7 @@
           <p:cNvPr id="2" name="Title 1">
             <a:extLst>
               <a:ext uri="{FF2B5EF4-FFF2-40B4-BE49-F238E27FC236}">
-                <a16:creationId xmlns:a16="http://schemas.microsoft.com/office/drawing/2014/main" id="{2FA608A8-1097-09CC-DBF3-79A6C2A419CA}"/>
+                <a16:creationId xmlns:a16="http://schemas.microsoft.com/office/drawing/2014/main" id="{C6D1CC1E-A8F6-C20A-83E5-70AD049691B1}"/>
               </a:ext>
             </a:extLst>
           </p:cNvPr>
@@ -4220,151 +4563,128 @@
           <a:p>
             <a:r>
               <a:rPr lang="en-US" dirty="0"/>
-              <a:t>Issues with JSON</a:t>
-            </a:r>
-          </a:p>
-        </p:txBody>
-      </p:sp>
-      <p:sp>
-        <p:nvSpPr>
-          <p:cNvPr id="6" name="Content Placeholder 5">
+              <a:t>Considering Database Efficiency</a:t>
+            </a:r>
+          </a:p>
+        </p:txBody>
+      </p:sp>
+      <p:pic>
+        <p:nvPicPr>
+          <p:cNvPr id="4" name="Content Placeholder 3">
             <a:extLst>
               <a:ext uri="{FF2B5EF4-FFF2-40B4-BE49-F238E27FC236}">
-                <a16:creationId xmlns:a16="http://schemas.microsoft.com/office/drawing/2014/main" id="{0AB23079-D75B-394F-1705-7A4282073A6E}"/>
-              </a:ext>
-            </a:extLst>
-          </p:cNvPr>
-          <p:cNvSpPr>
-            <a:spLocks noGrp="1"/>
-          </p:cNvSpPr>
-          <p:nvPr>
-            <p:ph idx="1"/>
-          </p:nvPr>
-        </p:nvSpPr>
-        <p:spPr>
-          <a:xfrm>
-            <a:off x="838200" y="1845360"/>
-            <a:ext cx="10515600" cy="4351338"/>
-          </a:xfrm>
-        </p:spPr>
-        <p:txBody>
-          <a:bodyPr/>
-          <a:lstStyle/>
-          <a:p>
-            <a:r>
-              <a:rPr lang="en-US" dirty="0"/>
-              <a:t>Ran into trouble getting JSON to display </a:t>
-            </a:r>
-            <a:r>
-              <a:rPr lang="en-US" dirty="0" err="1"/>
-              <a:t>DateTime</a:t>
-            </a:r>
-            <a:r>
-              <a:rPr lang="en-US" dirty="0"/>
-              <a:t> and Timespan.</a:t>
-            </a:r>
-          </a:p>
-          <a:p>
-            <a:r>
-              <a:rPr lang="en-US" dirty="0"/>
-              <a:t>The initial solution was to make these an object. </a:t>
-            </a:r>
-          </a:p>
-          <a:p>
-            <a:endParaRPr lang="en-US" dirty="0"/>
-          </a:p>
-          <a:p>
-            <a:endParaRPr lang="en-US" dirty="0"/>
-          </a:p>
-          <a:p>
-            <a:endParaRPr lang="en-US" dirty="0"/>
-          </a:p>
-          <a:p>
-            <a:endParaRPr lang="en-US" dirty="0"/>
-          </a:p>
-          <a:p>
-            <a:r>
-              <a:rPr lang="en-US" dirty="0"/>
-              <a:t>We then parse the data from the object into a </a:t>
-            </a:r>
-            <a:r>
-              <a:rPr lang="en-US" dirty="0" err="1"/>
-              <a:t>DateTime</a:t>
-            </a:r>
-            <a:r>
-              <a:rPr lang="en-US" dirty="0"/>
-              <a:t> data type</a:t>
-            </a:r>
-          </a:p>
-          <a:p>
-            <a:endParaRPr lang="en-US" dirty="0"/>
-          </a:p>
-        </p:txBody>
-      </p:sp>
-      <p:pic>
-        <p:nvPicPr>
-          <p:cNvPr id="8" name="Picture 7">
-            <a:extLst>
-              <a:ext uri="{FF2B5EF4-FFF2-40B4-BE49-F238E27FC236}">
-                <a16:creationId xmlns:a16="http://schemas.microsoft.com/office/drawing/2014/main" id="{74A32ECC-8DB0-3F07-9695-43E9E4B49E4C}"/>
+                <a16:creationId xmlns:a16="http://schemas.microsoft.com/office/drawing/2014/main" id="{B9C7B1B4-D5FC-11B5-0948-3A0B8F3FDD92}"/>
               </a:ext>
             </a:extLst>
           </p:cNvPr>
           <p:cNvPicPr>
-            <a:picLocks noChangeAspect="1"/>
+            <a:picLocks noGrp="1" noChangeAspect="1"/>
           </p:cNvPicPr>
-          <p:nvPr/>
+          <p:nvPr>
+            <p:ph idx="1"/>
+          </p:nvPr>
         </p:nvPicPr>
         <p:blipFill>
-          <a:blip r:embed="rId2"/>
-          <a:stretch>
-            <a:fillRect/>
-          </a:stretch>
+          <a:blip r:embed="rId2">
+            <a:extLst>
+              <a:ext uri="{28A0092B-C50C-407E-A947-70E740481C1C}">
+                <a14:useLocalDpi xmlns:a14="http://schemas.microsoft.com/office/drawing/2010/main" val="0"/>
+              </a:ext>
+            </a:extLst>
+          </a:blip>
+          <a:srcRect/>
+          <a:stretch/>
         </p:blipFill>
         <p:spPr>
           <a:xfrm>
-            <a:off x="5944499" y="3205512"/>
-            <a:ext cx="4763165" cy="1181265"/>
+            <a:off x="1214215" y="2891017"/>
+            <a:ext cx="8057350" cy="3195708"/>
           </a:xfrm>
           <a:prstGeom prst="rect">
             <a:avLst/>
           </a:prstGeom>
+          <a:ln w="28575">
+            <a:solidFill>
+              <a:schemeClr val="bg2"/>
+            </a:solidFill>
+          </a:ln>
         </p:spPr>
       </p:pic>
-      <p:pic>
-        <p:nvPicPr>
-          <p:cNvPr id="10" name="Picture 9">
+      <p:sp>
+        <p:nvSpPr>
+          <p:cNvPr id="5" name="TextBox 4">
             <a:extLst>
               <a:ext uri="{FF2B5EF4-FFF2-40B4-BE49-F238E27FC236}">
-                <a16:creationId xmlns:a16="http://schemas.microsoft.com/office/drawing/2014/main" id="{104D88C3-293E-BB89-0C62-585089F8BA00}"/>
+                <a16:creationId xmlns:a16="http://schemas.microsoft.com/office/drawing/2014/main" id="{6E7C4F21-2B0A-411A-AAF1-3080C71F9112}"/>
               </a:ext>
             </a:extLst>
           </p:cNvPr>
-          <p:cNvPicPr>
-            <a:picLocks noChangeAspect="1"/>
-          </p:cNvPicPr>
+          <p:cNvSpPr txBox="1"/>
           <p:nvPr/>
-        </p:nvPicPr>
-        <p:blipFill>
-          <a:blip r:embed="rId3"/>
-          <a:stretch>
-            <a:fillRect/>
-          </a:stretch>
-        </p:blipFill>
+        </p:nvSpPr>
         <p:spPr>
           <a:xfrm>
-            <a:off x="1159374" y="5543004"/>
-            <a:ext cx="7811590" cy="571580"/>
+            <a:off x="838201" y="1690688"/>
+            <a:ext cx="10348244" cy="1200329"/>
           </a:xfrm>
           <a:prstGeom prst="rect">
             <a:avLst/>
           </a:prstGeom>
+          <a:noFill/>
         </p:spPr>
-      </p:pic>
+        <p:txBody>
+          <a:bodyPr wrap="square" rtlCol="0">
+            <a:spAutoFit/>
+          </a:bodyPr>
+          <a:lstStyle/>
+          <a:p>
+            <a:pPr marL="285750" indent="-285750">
+              <a:buFont typeface="Arial" panose="020B0604020202020204" pitchFamily="34" charset="0"/>
+              <a:buChar char="•"/>
+            </a:pPr>
+            <a:r>
+              <a:rPr lang="en-US" dirty="0"/>
+              <a:t>Created a method to retrieve Reservations for a Location and a specific Date</a:t>
+            </a:r>
+          </a:p>
+          <a:p>
+            <a:pPr marL="285750" indent="-285750">
+              <a:buFont typeface="Arial" panose="020B0604020202020204" pitchFamily="34" charset="0"/>
+              <a:buChar char="•"/>
+            </a:pPr>
+            <a:endParaRPr lang="en-US" dirty="0"/>
+          </a:p>
+          <a:p>
+            <a:pPr marL="285750" indent="-285750">
+              <a:buFont typeface="Arial" panose="020B0604020202020204" pitchFamily="34" charset="0"/>
+              <a:buChar char="•"/>
+            </a:pPr>
+            <a:r>
+              <a:rPr lang="en-US" dirty="0"/>
+              <a:t>Allows the </a:t>
+            </a:r>
+            <a:r>
+              <a:rPr lang="en-US" dirty="0" err="1"/>
+              <a:t>CheckOverlap</a:t>
+            </a:r>
+            <a:r>
+              <a:rPr lang="en-US" dirty="0"/>
+              <a:t> method to pull smaller data sections to reduce lag as database scales up in size </a:t>
+            </a:r>
+          </a:p>
+          <a:p>
+            <a:pPr marL="285750" indent="-285750">
+              <a:buFont typeface="Arial" panose="020B0604020202020204" pitchFamily="34" charset="0"/>
+              <a:buChar char="•"/>
+            </a:pPr>
+            <a:endParaRPr lang="en-US" dirty="0"/>
+          </a:p>
+        </p:txBody>
+      </p:sp>
     </p:spTree>
     <p:extLst>
       <p:ext uri="{BB962C8B-B14F-4D97-AF65-F5344CB8AC3E}">
-        <p14:creationId xmlns:p14="http://schemas.microsoft.com/office/powerpoint/2010/main" val="853883687"/>
+        <p14:creationId xmlns:p14="http://schemas.microsoft.com/office/powerpoint/2010/main" val="1737440845"/>
       </p:ext>
     </p:extLst>
   </p:cSld>
@@ -4396,7 +4716,7 @@
           <p:cNvPr id="2" name="Title 1">
             <a:extLst>
               <a:ext uri="{FF2B5EF4-FFF2-40B4-BE49-F238E27FC236}">
-                <a16:creationId xmlns:a16="http://schemas.microsoft.com/office/drawing/2014/main" id="{C6D1CC1E-A8F6-C20A-83E5-70AD049691B1}"/>
+                <a16:creationId xmlns:a16="http://schemas.microsoft.com/office/drawing/2014/main" id="{2FA608A8-1097-09CC-DBF3-79A6C2A419CA}"/>
               </a:ext>
             </a:extLst>
           </p:cNvPr>
@@ -4414,26 +4734,125 @@
           <a:p>
             <a:r>
               <a:rPr lang="en-US" dirty="0"/>
-              <a:t>Query Filtering</a:t>
-            </a:r>
+              <a:t>Data Types with JSON</a:t>
+            </a:r>
+          </a:p>
+        </p:txBody>
+      </p:sp>
+      <p:sp>
+        <p:nvSpPr>
+          <p:cNvPr id="6" name="Content Placeholder 5">
+            <a:extLst>
+              <a:ext uri="{FF2B5EF4-FFF2-40B4-BE49-F238E27FC236}">
+                <a16:creationId xmlns:a16="http://schemas.microsoft.com/office/drawing/2014/main" id="{0AB23079-D75B-394F-1705-7A4282073A6E}"/>
+              </a:ext>
+            </a:extLst>
+          </p:cNvPr>
+          <p:cNvSpPr>
+            <a:spLocks noGrp="1"/>
+          </p:cNvSpPr>
+          <p:nvPr>
+            <p:ph idx="1"/>
+          </p:nvPr>
+        </p:nvSpPr>
+        <p:spPr>
+          <a:xfrm>
+            <a:off x="838200" y="1776172"/>
+            <a:ext cx="10515600" cy="4348163"/>
+          </a:xfrm>
+        </p:spPr>
+        <p:txBody>
+          <a:bodyPr/>
+          <a:lstStyle/>
+          <a:p>
+            <a:r>
+              <a:rPr lang="en-US" sz="1800" dirty="0"/>
+              <a:t>SQL and C# both have </a:t>
+            </a:r>
+            <a:r>
+              <a:rPr lang="en-US" sz="1800" dirty="0" err="1"/>
+              <a:t>DateTime</a:t>
+            </a:r>
+            <a:r>
+              <a:rPr lang="en-US" sz="1800" dirty="0"/>
+              <a:t> and </a:t>
+            </a:r>
+            <a:r>
+              <a:rPr lang="en-US" sz="1800" dirty="0" err="1"/>
+              <a:t>TimeSpan</a:t>
+            </a:r>
+            <a:r>
+              <a:rPr lang="en-US" sz="1800" dirty="0"/>
+              <a:t> data type.</a:t>
+            </a:r>
+          </a:p>
+          <a:p>
+            <a:r>
+              <a:rPr lang="en-US" sz="1800" dirty="0"/>
+              <a:t>The API passes through JSON which does not have those data types.</a:t>
+            </a:r>
+          </a:p>
+          <a:p>
+            <a:r>
+              <a:rPr lang="en-US" sz="1800" dirty="0"/>
+              <a:t>Our solution is to make those “object” data types initially. </a:t>
+            </a:r>
+          </a:p>
+          <a:p>
+            <a:endParaRPr lang="en-US" dirty="0"/>
+          </a:p>
+          <a:p>
+            <a:endParaRPr lang="en-US" dirty="0"/>
+          </a:p>
+          <a:p>
+            <a:pPr marL="0" indent="0">
+              <a:buNone/>
+            </a:pPr>
+            <a:endParaRPr lang="en-US" sz="2400" dirty="0"/>
+          </a:p>
+          <a:p>
+            <a:endParaRPr lang="en-US" sz="1800" dirty="0"/>
+          </a:p>
+          <a:p>
+            <a:r>
+              <a:rPr lang="en-US" sz="1800" dirty="0"/>
+              <a:t>We then parse the data from the object into a </a:t>
+            </a:r>
+            <a:r>
+              <a:rPr lang="en-US" sz="1800" dirty="0" err="1"/>
+              <a:t>DateTime</a:t>
+            </a:r>
+            <a:r>
+              <a:rPr lang="en-US" sz="1800" dirty="0"/>
+              <a:t> (or </a:t>
+            </a:r>
+            <a:r>
+              <a:rPr lang="en-US" sz="1800" dirty="0" err="1"/>
+              <a:t>TimeSpan</a:t>
+            </a:r>
+            <a:r>
+              <a:rPr lang="en-US" sz="1800" dirty="0"/>
+              <a:t>) data type</a:t>
+            </a:r>
+          </a:p>
+          <a:p>
+            <a:endParaRPr lang="en-US" dirty="0"/>
           </a:p>
         </p:txBody>
       </p:sp>
       <p:pic>
         <p:nvPicPr>
-          <p:cNvPr id="4" name="Content Placeholder 3">
+          <p:cNvPr id="8" name="Picture 7">
             <a:extLst>
               <a:ext uri="{FF2B5EF4-FFF2-40B4-BE49-F238E27FC236}">
-                <a16:creationId xmlns:a16="http://schemas.microsoft.com/office/drawing/2014/main" id="{B9C7B1B4-D5FC-11B5-0948-3A0B8F3FDD92}"/>
+                <a16:creationId xmlns:a16="http://schemas.microsoft.com/office/drawing/2014/main" id="{74A32ECC-8DB0-3F07-9695-43E9E4B49E4C}"/>
               </a:ext>
             </a:extLst>
           </p:cNvPr>
           <p:cNvPicPr>
-            <a:picLocks noGrp="1" noChangeAspect="1"/>
+            <a:picLocks noChangeAspect="1"/>
           </p:cNvPicPr>
-          <p:nvPr>
-            <p:ph idx="1"/>
-          </p:nvPr>
+          <p:nvPr/>
         </p:nvPicPr>
         <p:blipFill>
           <a:blip r:embed="rId2"/>
@@ -4443,18 +4862,58 @@
         </p:blipFill>
         <p:spPr>
           <a:xfrm>
-            <a:off x="2067325" y="1825625"/>
-            <a:ext cx="8057350" cy="4351338"/>
+            <a:off x="1113325" y="3182491"/>
+            <a:ext cx="4763165" cy="1181265"/>
           </a:xfrm>
           <a:prstGeom prst="rect">
             <a:avLst/>
           </a:prstGeom>
+          <a:ln w="28575">
+            <a:solidFill>
+              <a:schemeClr val="bg2"/>
+            </a:solidFill>
+          </a:ln>
+        </p:spPr>
+      </p:pic>
+      <p:pic>
+        <p:nvPicPr>
+          <p:cNvPr id="10" name="Picture 9">
+            <a:extLst>
+              <a:ext uri="{FF2B5EF4-FFF2-40B4-BE49-F238E27FC236}">
+                <a16:creationId xmlns:a16="http://schemas.microsoft.com/office/drawing/2014/main" id="{104D88C3-293E-BB89-0C62-585089F8BA00}"/>
+              </a:ext>
+            </a:extLst>
+          </p:cNvPr>
+          <p:cNvPicPr>
+            <a:picLocks noChangeAspect="1"/>
+          </p:cNvPicPr>
+          <p:nvPr/>
+        </p:nvPicPr>
+        <p:blipFill>
+          <a:blip r:embed="rId3"/>
+          <a:stretch>
+            <a:fillRect/>
+          </a:stretch>
+        </p:blipFill>
+        <p:spPr>
+          <a:xfrm>
+            <a:off x="1113325" y="5435191"/>
+            <a:ext cx="7811590" cy="571580"/>
+          </a:xfrm>
+          <a:prstGeom prst="rect">
+            <a:avLst/>
+          </a:prstGeom>
+          <a:ln w="28575">
+            <a:solidFill>
+              <a:schemeClr val="bg2"/>
+            </a:solidFill>
+          </a:ln>
         </p:spPr>
       </p:pic>
     </p:spTree>
     <p:extLst>
       <p:ext uri="{BB962C8B-B14F-4D97-AF65-F5344CB8AC3E}">
-        <p14:creationId xmlns:p14="http://schemas.microsoft.com/office/powerpoint/2010/main" val="2556566680"/>
+        <p14:creationId xmlns:p14="http://schemas.microsoft.com/office/powerpoint/2010/main" val="853883687"/>
       </p:ext>
     </p:extLst>
   </p:cSld>
@@ -4486,7 +4945,7 @@
           <p:cNvPr id="2" name="Title 1">
             <a:extLst>
               <a:ext uri="{FF2B5EF4-FFF2-40B4-BE49-F238E27FC236}">
-                <a16:creationId xmlns:a16="http://schemas.microsoft.com/office/drawing/2014/main" id="{85066520-7E8A-E566-00DD-21FA4D5A7865}"/>
+                <a16:creationId xmlns:a16="http://schemas.microsoft.com/office/drawing/2014/main" id="{C6D1CC1E-A8F6-C20A-83E5-70AD049691B1}"/>
               </a:ext>
             </a:extLst>
           </p:cNvPr>
@@ -4504,17 +4963,17 @@
           <a:p>
             <a:r>
               <a:rPr lang="en-US" dirty="0"/>
-              <a:t>Entity Relationship Diagram</a:t>
+              <a:t>Query Filtering</a:t>
             </a:r>
           </a:p>
         </p:txBody>
       </p:sp>
       <p:pic>
         <p:nvPicPr>
-          <p:cNvPr id="7" name="Content Placeholder 6">
+          <p:cNvPr id="4" name="Content Placeholder 3">
             <a:extLst>
               <a:ext uri="{FF2B5EF4-FFF2-40B4-BE49-F238E27FC236}">
-                <a16:creationId xmlns:a16="http://schemas.microsoft.com/office/drawing/2014/main" id="{121541A9-FAA8-F682-EE03-854831A8CC65}"/>
+                <a16:creationId xmlns:a16="http://schemas.microsoft.com/office/drawing/2014/main" id="{B9C7B1B4-D5FC-11B5-0948-3A0B8F3FDD92}"/>
               </a:ext>
             </a:extLst>
           </p:cNvPr>
@@ -4533,15 +4992,86 @@
         </p:blipFill>
         <p:spPr>
           <a:xfrm>
-            <a:off x="3225133" y="1825625"/>
-            <a:ext cx="5741733" cy="4351338"/>
+            <a:off x="3652723" y="1690688"/>
+            <a:ext cx="8057350" cy="4351338"/>
           </a:xfrm>
+          <a:prstGeom prst="rect">
+            <a:avLst/>
+          </a:prstGeom>
+          <a:ln w="28575">
+            <a:solidFill>
+              <a:schemeClr val="bg2"/>
+            </a:solidFill>
+          </a:ln>
         </p:spPr>
       </p:pic>
+      <p:sp>
+        <p:nvSpPr>
+          <p:cNvPr id="5" name="TextBox 4">
+            <a:extLst>
+              <a:ext uri="{FF2B5EF4-FFF2-40B4-BE49-F238E27FC236}">
+                <a16:creationId xmlns:a16="http://schemas.microsoft.com/office/drawing/2014/main" id="{6E7C4F21-2B0A-411A-AAF1-3080C71F9112}"/>
+              </a:ext>
+            </a:extLst>
+          </p:cNvPr>
+          <p:cNvSpPr txBox="1"/>
+          <p:nvPr/>
+        </p:nvSpPr>
+        <p:spPr>
+          <a:xfrm>
+            <a:off x="838200" y="1690688"/>
+            <a:ext cx="2549685" cy="3416320"/>
+          </a:xfrm>
+          <a:prstGeom prst="rect">
+            <a:avLst/>
+          </a:prstGeom>
+          <a:noFill/>
+        </p:spPr>
+        <p:txBody>
+          <a:bodyPr wrap="square" rtlCol="0">
+            <a:spAutoFit/>
+          </a:bodyPr>
+          <a:lstStyle/>
+          <a:p>
+            <a:pPr marL="285750" indent="-285750">
+              <a:buFont typeface="Arial" panose="020B0604020202020204" pitchFamily="34" charset="0"/>
+              <a:buChar char="•"/>
+            </a:pPr>
+            <a:r>
+              <a:rPr lang="en-US" dirty="0"/>
+              <a:t>Adapting null check for different (sometimes not nullable) data types</a:t>
+            </a:r>
+          </a:p>
+          <a:p>
+            <a:pPr marL="285750" indent="-285750">
+              <a:buFont typeface="Arial" panose="020B0604020202020204" pitchFamily="34" charset="0"/>
+              <a:buChar char="•"/>
+            </a:pPr>
+            <a:endParaRPr lang="en-US" dirty="0"/>
+          </a:p>
+          <a:p>
+            <a:pPr marL="285750" indent="-285750">
+              <a:buFont typeface="Arial" panose="020B0604020202020204" pitchFamily="34" charset="0"/>
+              <a:buChar char="•"/>
+            </a:pPr>
+            <a:r>
+              <a:rPr lang="en-US" dirty="0"/>
+              <a:t>Refactored code to allow more user friendly filtering, factoring in what they would expect from a given parameter. </a:t>
+            </a:r>
+          </a:p>
+          <a:p>
+            <a:pPr marL="285750" indent="-285750">
+              <a:buFont typeface="Arial" panose="020B0604020202020204" pitchFamily="34" charset="0"/>
+              <a:buChar char="•"/>
+            </a:pPr>
+            <a:endParaRPr lang="en-US" dirty="0"/>
+          </a:p>
+        </p:txBody>
+      </p:sp>
     </p:spTree>
     <p:extLst>
       <p:ext uri="{BB962C8B-B14F-4D97-AF65-F5344CB8AC3E}">
-        <p14:creationId xmlns:p14="http://schemas.microsoft.com/office/powerpoint/2010/main" val="3621785901"/>
+        <p14:creationId xmlns:p14="http://schemas.microsoft.com/office/powerpoint/2010/main" val="2556566680"/>
       </p:ext>
     </p:extLst>
   </p:cSld>
@@ -4573,7 +5103,7 @@
           <p:cNvPr id="2" name="Title 1">
             <a:extLst>
               <a:ext uri="{FF2B5EF4-FFF2-40B4-BE49-F238E27FC236}">
-                <a16:creationId xmlns:a16="http://schemas.microsoft.com/office/drawing/2014/main" id="{1A60EEA8-B264-D669-E70B-1AB5353E3EBB}"/>
+                <a16:creationId xmlns:a16="http://schemas.microsoft.com/office/drawing/2014/main" id="{85066520-7E8A-E566-00DD-21FA4D5A7865}"/>
               </a:ext>
             </a:extLst>
           </p:cNvPr>
@@ -4591,87 +5121,44 @@
           <a:p>
             <a:r>
               <a:rPr lang="en-US" dirty="0"/>
-              <a:t>Brand</a:t>
-            </a:r>
-          </a:p>
-        </p:txBody>
-      </p:sp>
-      <p:sp>
-        <p:nvSpPr>
-          <p:cNvPr id="3" name="Content Placeholder 2">
+              <a:t>Entity Relationship Diagram</a:t>
+            </a:r>
+          </a:p>
+        </p:txBody>
+      </p:sp>
+      <p:pic>
+        <p:nvPicPr>
+          <p:cNvPr id="7" name="Content Placeholder 6">
             <a:extLst>
               <a:ext uri="{FF2B5EF4-FFF2-40B4-BE49-F238E27FC236}">
-                <a16:creationId xmlns:a16="http://schemas.microsoft.com/office/drawing/2014/main" id="{3A1AF449-D067-A1AA-7B72-80FD07CFA9FF}"/>
+                <a16:creationId xmlns:a16="http://schemas.microsoft.com/office/drawing/2014/main" id="{121541A9-FAA8-F682-EE03-854831A8CC65}"/>
               </a:ext>
             </a:extLst>
           </p:cNvPr>
-          <p:cNvSpPr>
-            <a:spLocks noGrp="1"/>
-          </p:cNvSpPr>
+          <p:cNvPicPr>
+            <a:picLocks noGrp="1" noChangeAspect="1"/>
+          </p:cNvPicPr>
           <p:nvPr>
             <p:ph idx="1"/>
           </p:nvPr>
-        </p:nvSpPr>
-        <p:spPr/>
-        <p:txBody>
-          <a:bodyPr>
-            <a:normAutofit/>
-          </a:bodyPr>
-          <a:lstStyle/>
-          <a:p>
-            <a:pPr lvl="1"/>
-            <a:r>
-              <a:rPr lang="en-US" dirty="0"/>
-              <a:t>Attributes</a:t>
-            </a:r>
-          </a:p>
-          <a:p>
-            <a:pPr lvl="2"/>
-            <a:r>
-              <a:rPr lang="en-US" dirty="0"/>
-              <a:t>Id</a:t>
-            </a:r>
-          </a:p>
-          <a:p>
-            <a:pPr lvl="2"/>
-            <a:r>
-              <a:rPr lang="en-US" dirty="0"/>
-              <a:t>Name</a:t>
-            </a:r>
-          </a:p>
-          <a:p>
-            <a:pPr lvl="1"/>
-            <a:r>
-              <a:rPr lang="en-US" dirty="0"/>
-              <a:t>Constraints</a:t>
-            </a:r>
-          </a:p>
-          <a:p>
-            <a:pPr lvl="2"/>
-            <a:r>
-              <a:rPr lang="en-US" dirty="0"/>
-              <a:t>Must own at least one or more Locations</a:t>
-            </a:r>
-          </a:p>
-          <a:p>
-            <a:pPr lvl="2"/>
-            <a:r>
-              <a:rPr lang="en-US" dirty="0"/>
-              <a:t>Exists in case this technology expands to include multiple brands</a:t>
-            </a:r>
-          </a:p>
-          <a:p>
-            <a:pPr marL="0" indent="0">
-              <a:buNone/>
-            </a:pPr>
-            <a:endParaRPr lang="en-US" dirty="0"/>
-          </a:p>
-        </p:txBody>
-      </p:sp>
+        </p:nvPicPr>
+        <p:blipFill>
+          <a:blip r:embed="rId2"/>
+          <a:stretch>
+            <a:fillRect/>
+          </a:stretch>
+        </p:blipFill>
+        <p:spPr>
+          <a:xfrm>
+            <a:off x="2953588" y="1617977"/>
+            <a:ext cx="6284823" cy="4762916"/>
+          </a:xfrm>
+        </p:spPr>
+      </p:pic>
     </p:spTree>
     <p:extLst>
       <p:ext uri="{BB962C8B-B14F-4D97-AF65-F5344CB8AC3E}">
-        <p14:creationId xmlns:p14="http://schemas.microsoft.com/office/powerpoint/2010/main" val="3932579753"/>
+        <p14:creationId xmlns:p14="http://schemas.microsoft.com/office/powerpoint/2010/main" val="3621785901"/>
       </p:ext>
     </p:extLst>
   </p:cSld>
@@ -4703,7 +5190,7 @@
           <p:cNvPr id="2" name="Title 1">
             <a:extLst>
               <a:ext uri="{FF2B5EF4-FFF2-40B4-BE49-F238E27FC236}">
-                <a16:creationId xmlns:a16="http://schemas.microsoft.com/office/drawing/2014/main" id="{C98B5AAA-3338-BF7B-9DDB-1D664EF7AEC8}"/>
+                <a16:creationId xmlns:a16="http://schemas.microsoft.com/office/drawing/2014/main" id="{1A60EEA8-B264-D669-E70B-1AB5353E3EBB}"/>
               </a:ext>
             </a:extLst>
           </p:cNvPr>
@@ -4721,7 +5208,7 @@
           <a:p>
             <a:r>
               <a:rPr lang="en-US" dirty="0"/>
-              <a:t>Customer</a:t>
+              <a:t>Brand</a:t>
             </a:r>
           </a:p>
         </p:txBody>
@@ -4731,7 +5218,7 @@
           <p:cNvPr id="3" name="Content Placeholder 2">
             <a:extLst>
               <a:ext uri="{FF2B5EF4-FFF2-40B4-BE49-F238E27FC236}">
-                <a16:creationId xmlns:a16="http://schemas.microsoft.com/office/drawing/2014/main" id="{4C4B0F0F-91BF-CF30-EE49-A31382816E61}"/>
+                <a16:creationId xmlns:a16="http://schemas.microsoft.com/office/drawing/2014/main" id="{3A1AF449-D067-A1AA-7B72-80FD07CFA9FF}"/>
               </a:ext>
             </a:extLst>
           </p:cNvPr>
@@ -4742,71 +5229,110 @@
             <p:ph idx="1"/>
           </p:nvPr>
         </p:nvSpPr>
-        <p:spPr/>
-        <p:txBody>
-          <a:bodyPr/>
-          <a:lstStyle/>
-          <a:p>
+        <p:spPr>
+          <a:xfrm>
+            <a:off x="397446" y="1851939"/>
+            <a:ext cx="5319199" cy="4351338"/>
+          </a:xfrm>
+        </p:spPr>
+        <p:txBody>
+          <a:bodyPr>
+            <a:normAutofit/>
+          </a:bodyPr>
+          <a:lstStyle/>
+          <a:p>
+            <a:pPr marL="457200" lvl="1" indent="0">
+              <a:buNone/>
+            </a:pPr>
             <a:r>
               <a:rPr lang="en-US" dirty="0"/>
               <a:t>Attributes</a:t>
             </a:r>
           </a:p>
           <a:p>
-            <a:pPr lvl="1"/>
-            <a:r>
-              <a:rPr lang="en-US" dirty="0"/>
+            <a:pPr lvl="2"/>
+            <a:r>
+              <a:rPr lang="en-US" sz="1800" dirty="0"/>
               <a:t>Id</a:t>
             </a:r>
           </a:p>
           <a:p>
-            <a:pPr lvl="1"/>
-            <a:r>
-              <a:rPr lang="en-US" dirty="0"/>
-              <a:t>FirstName</a:t>
-            </a:r>
-          </a:p>
-          <a:p>
-            <a:pPr lvl="1"/>
-            <a:r>
-              <a:rPr lang="en-US" dirty="0" err="1"/>
-              <a:t>LastName</a:t>
-            </a:r>
-            <a:endParaRPr lang="en-US" dirty="0"/>
-          </a:p>
-          <a:p>
-            <a:pPr lvl="1"/>
-            <a:r>
-              <a:rPr lang="en-US" dirty="0"/>
-              <a:t>Phone</a:t>
-            </a:r>
-          </a:p>
-          <a:p>
-            <a:pPr lvl="1"/>
-            <a:r>
-              <a:rPr lang="en-US" dirty="0"/>
-              <a:t>Email</a:t>
-            </a:r>
-          </a:p>
-          <a:p>
+            <a:pPr lvl="2"/>
+            <a:r>
+              <a:rPr lang="en-US" sz="1800" dirty="0"/>
+              <a:t>Name</a:t>
+            </a:r>
+          </a:p>
+          <a:p>
+            <a:pPr marL="457200" lvl="1" indent="0">
+              <a:buNone/>
+            </a:pPr>
             <a:r>
               <a:rPr lang="en-US" dirty="0"/>
               <a:t>Constraints</a:t>
             </a:r>
           </a:p>
           <a:p>
-            <a:pPr lvl="1"/>
-            <a:r>
-              <a:rPr lang="en-US" dirty="0"/>
-              <a:t>Can have 0 or many Reservations</a:t>
-            </a:r>
-          </a:p>
-        </p:txBody>
-      </p:sp>
+            <a:pPr lvl="2"/>
+            <a:r>
+              <a:rPr lang="en-US" sz="1800" dirty="0"/>
+              <a:t>Must own at least one or more Locations</a:t>
+            </a:r>
+          </a:p>
+          <a:p>
+            <a:pPr lvl="2"/>
+            <a:r>
+              <a:rPr lang="en-US" sz="1800" dirty="0"/>
+              <a:t>Exists in case this technology expands to include multiple brands</a:t>
+            </a:r>
+          </a:p>
+          <a:p>
+            <a:pPr marL="0" indent="0">
+              <a:buNone/>
+            </a:pPr>
+            <a:endParaRPr lang="en-US" dirty="0"/>
+          </a:p>
+        </p:txBody>
+      </p:sp>
+      <p:pic>
+        <p:nvPicPr>
+          <p:cNvPr id="5" name="Picture 4">
+            <a:extLst>
+              <a:ext uri="{FF2B5EF4-FFF2-40B4-BE49-F238E27FC236}">
+                <a16:creationId xmlns:a16="http://schemas.microsoft.com/office/drawing/2014/main" id="{694905E5-E41C-457A-8565-BC92C25378E4}"/>
+              </a:ext>
+            </a:extLst>
+          </p:cNvPr>
+          <p:cNvPicPr>
+            <a:picLocks noChangeAspect="1"/>
+          </p:cNvPicPr>
+          <p:nvPr/>
+        </p:nvPicPr>
+        <p:blipFill>
+          <a:blip r:embed="rId2"/>
+          <a:stretch>
+            <a:fillRect/>
+          </a:stretch>
+        </p:blipFill>
+        <p:spPr>
+          <a:xfrm>
+            <a:off x="6475357" y="1504681"/>
+            <a:ext cx="4286848" cy="3848637"/>
+          </a:xfrm>
+          <a:prstGeom prst="rect">
+            <a:avLst/>
+          </a:prstGeom>
+          <a:ln w="28575">
+            <a:solidFill>
+              <a:schemeClr val="bg2"/>
+            </a:solidFill>
+          </a:ln>
+        </p:spPr>
+      </p:pic>
     </p:spTree>
     <p:extLst>
       <p:ext uri="{BB962C8B-B14F-4D97-AF65-F5344CB8AC3E}">
-        <p14:creationId xmlns:p14="http://schemas.microsoft.com/office/powerpoint/2010/main" val="3879146880"/>
+        <p14:creationId xmlns:p14="http://schemas.microsoft.com/office/powerpoint/2010/main" val="3932579753"/>
       </p:ext>
     </p:extLst>
   </p:cSld>

</xml_diff>